<commit_message>
Added Display blocks reference content
</commit_message>
<xml_diff>
--- a/docs/source/images/kookablockly_display.pptx
+++ b/docs/source/images/kookablockly_display.pptx
@@ -6,6 +6,7 @@
   </p:sldMasterIdLst>
   <p:sldIdLst>
     <p:sldId id="256" r:id="rId2"/>
+    <p:sldId id="257" r:id="rId3"/>
   </p:sldIdLst>
   <p:sldSz cx="12192000" cy="6858000"/>
   <p:notesSz cx="6858000" cy="9144000"/>
@@ -135,8 +136,8 @@
 <pc:chgInfo xmlns:a="http://schemas.openxmlformats.org/drawingml/2006/main" xmlns:r="http://schemas.openxmlformats.org/officeDocument/2006/relationships" xmlns:ac="http://schemas.microsoft.com/office/drawing/2013/main/command" xmlns:pc="http://schemas.microsoft.com/office/powerpoint/2013/main/command">
   <pc:docChgLst>
     <pc:chgData name="Tony Strasser" userId="4957b490a1ac7b63" providerId="LiveId" clId="{ECA84D97-D422-4983-BFFB-C044D23D5B9C}"/>
-    <pc:docChg chg="modSld">
-      <pc:chgData name="Tony Strasser" userId="4957b490a1ac7b63" providerId="LiveId" clId="{ECA84D97-D422-4983-BFFB-C044D23D5B9C}" dt="2023-10-07T00:57:37.058" v="0" actId="164"/>
+    <pc:docChg chg="addSld modSld">
+      <pc:chgData name="Tony Strasser" userId="4957b490a1ac7b63" providerId="LiveId" clId="{ECA84D97-D422-4983-BFFB-C044D23D5B9C}" dt="2023-10-09T00:43:37.311" v="1" actId="680"/>
       <pc:docMkLst>
         <pc:docMk/>
       </pc:docMkLst>
@@ -355,6 +356,13 @@
           </ac:picMkLst>
         </pc:picChg>
       </pc:sldChg>
+      <pc:sldChg chg="new">
+        <pc:chgData name="Tony Strasser" userId="4957b490a1ac7b63" providerId="LiveId" clId="{ECA84D97-D422-4983-BFFB-C044D23D5B9C}" dt="2023-10-09T00:43:37.311" v="1" actId="680"/>
+        <pc:sldMkLst>
+          <pc:docMk/>
+          <pc:sldMk cId="2627330338" sldId="257"/>
+        </pc:sldMkLst>
+      </pc:sldChg>
     </pc:docChg>
   </pc:docChgLst>
 </pc:chgInfo>
@@ -509,7 +517,7 @@
           <a:p>
             <a:fld id="{1C85E7D2-0D4B-4CBD-9C3E-4AB330E2219F}" type="datetimeFigureOut">
               <a:rPr lang="en-AU" smtClean="0"/>
-              <a:t>7/10/2023</a:t>
+              <a:t>9/10/2023</a:t>
             </a:fld>
             <a:endParaRPr lang="en-AU"/>
           </a:p>
@@ -709,7 +717,7 @@
           <a:p>
             <a:fld id="{1C85E7D2-0D4B-4CBD-9C3E-4AB330E2219F}" type="datetimeFigureOut">
               <a:rPr lang="en-AU" smtClean="0"/>
-              <a:t>7/10/2023</a:t>
+              <a:t>9/10/2023</a:t>
             </a:fld>
             <a:endParaRPr lang="en-AU"/>
           </a:p>
@@ -919,7 +927,7 @@
           <a:p>
             <a:fld id="{1C85E7D2-0D4B-4CBD-9C3E-4AB330E2219F}" type="datetimeFigureOut">
               <a:rPr lang="en-AU" smtClean="0"/>
-              <a:t>7/10/2023</a:t>
+              <a:t>9/10/2023</a:t>
             </a:fld>
             <a:endParaRPr lang="en-AU"/>
           </a:p>
@@ -1119,7 +1127,7 @@
           <a:p>
             <a:fld id="{1C85E7D2-0D4B-4CBD-9C3E-4AB330E2219F}" type="datetimeFigureOut">
               <a:rPr lang="en-AU" smtClean="0"/>
-              <a:t>7/10/2023</a:t>
+              <a:t>9/10/2023</a:t>
             </a:fld>
             <a:endParaRPr lang="en-AU"/>
           </a:p>
@@ -1395,7 +1403,7 @@
           <a:p>
             <a:fld id="{1C85E7D2-0D4B-4CBD-9C3E-4AB330E2219F}" type="datetimeFigureOut">
               <a:rPr lang="en-AU" smtClean="0"/>
-              <a:t>7/10/2023</a:t>
+              <a:t>9/10/2023</a:t>
             </a:fld>
             <a:endParaRPr lang="en-AU"/>
           </a:p>
@@ -1663,7 +1671,7 @@
           <a:p>
             <a:fld id="{1C85E7D2-0D4B-4CBD-9C3E-4AB330E2219F}" type="datetimeFigureOut">
               <a:rPr lang="en-AU" smtClean="0"/>
-              <a:t>7/10/2023</a:t>
+              <a:t>9/10/2023</a:t>
             </a:fld>
             <a:endParaRPr lang="en-AU"/>
           </a:p>
@@ -2078,7 +2086,7 @@
           <a:p>
             <a:fld id="{1C85E7D2-0D4B-4CBD-9C3E-4AB330E2219F}" type="datetimeFigureOut">
               <a:rPr lang="en-AU" smtClean="0"/>
-              <a:t>7/10/2023</a:t>
+              <a:t>9/10/2023</a:t>
             </a:fld>
             <a:endParaRPr lang="en-AU"/>
           </a:p>
@@ -2220,7 +2228,7 @@
           <a:p>
             <a:fld id="{1C85E7D2-0D4B-4CBD-9C3E-4AB330E2219F}" type="datetimeFigureOut">
               <a:rPr lang="en-AU" smtClean="0"/>
-              <a:t>7/10/2023</a:t>
+              <a:t>9/10/2023</a:t>
             </a:fld>
             <a:endParaRPr lang="en-AU"/>
           </a:p>
@@ -2333,7 +2341,7 @@
           <a:p>
             <a:fld id="{1C85E7D2-0D4B-4CBD-9C3E-4AB330E2219F}" type="datetimeFigureOut">
               <a:rPr lang="en-AU" smtClean="0"/>
-              <a:t>7/10/2023</a:t>
+              <a:t>9/10/2023</a:t>
             </a:fld>
             <a:endParaRPr lang="en-AU"/>
           </a:p>
@@ -2646,7 +2654,7 @@
           <a:p>
             <a:fld id="{1C85E7D2-0D4B-4CBD-9C3E-4AB330E2219F}" type="datetimeFigureOut">
               <a:rPr lang="en-AU" smtClean="0"/>
-              <a:t>7/10/2023</a:t>
+              <a:t>9/10/2023</a:t>
             </a:fld>
             <a:endParaRPr lang="en-AU"/>
           </a:p>
@@ -2935,7 +2943,7 @@
           <a:p>
             <a:fld id="{1C85E7D2-0D4B-4CBD-9C3E-4AB330E2219F}" type="datetimeFigureOut">
               <a:rPr lang="en-AU" smtClean="0"/>
-              <a:t>7/10/2023</a:t>
+              <a:t>9/10/2023</a:t>
             </a:fld>
             <a:endParaRPr lang="en-AU"/>
           </a:p>
@@ -3178,7 +3186,7 @@
           <a:p>
             <a:fld id="{1C85E7D2-0D4B-4CBD-9C3E-4AB330E2219F}" type="datetimeFigureOut">
               <a:rPr lang="en-AU" smtClean="0"/>
-              <a:t>7/10/2023</a:t>
+              <a:t>9/10/2023</a:t>
             </a:fld>
             <a:endParaRPr lang="en-AU"/>
           </a:p>
@@ -4658,6 +4666,36 @@
 </p:sld>
 </file>
 
+<file path=ppt/slides/slide2.xml><?xml version="1.0" encoding="utf-8"?>
+<p:sld xmlns:a="http://schemas.openxmlformats.org/drawingml/2006/main" xmlns:r="http://schemas.openxmlformats.org/officeDocument/2006/relationships" xmlns:p="http://schemas.openxmlformats.org/presentationml/2006/main">
+  <p:cSld>
+    <p:spTree>
+      <p:nvGrpSpPr>
+        <p:cNvPr id="1" name=""/>
+        <p:cNvGrpSpPr/>
+        <p:nvPr/>
+      </p:nvGrpSpPr>
+      <p:grpSpPr>
+        <a:xfrm>
+          <a:off x="0" y="0"/>
+          <a:ext cx="0" cy="0"/>
+          <a:chOff x="0" y="0"/>
+          <a:chExt cx="0" cy="0"/>
+        </a:xfrm>
+      </p:grpSpPr>
+    </p:spTree>
+    <p:extLst>
+      <p:ext uri="{BB962C8B-B14F-4D97-AF65-F5344CB8AC3E}">
+        <p14:creationId xmlns:p14="http://schemas.microsoft.com/office/powerpoint/2010/main" val="2627330338"/>
+      </p:ext>
+    </p:extLst>
+  </p:cSld>
+  <p:clrMapOvr>
+    <a:masterClrMapping/>
+  </p:clrMapOvr>
+</p:sld>
+</file>
+
 <file path=ppt/theme/theme1.xml><?xml version="1.0" encoding="utf-8"?>
 <a:theme xmlns:a="http://schemas.openxmlformats.org/drawingml/2006/main" name="Office Theme">
   <a:themeElements>

</xml_diff>

<commit_message>
Added At Start Up button functionality
</commit_message>
<xml_diff>
--- a/docs/source/images/kookablockly_display.pptx
+++ b/docs/source/images/kookablockly_display.pptx
@@ -127,7 +127,7 @@
 <file path=ppt/revisionInfo.xml><?xml version="1.0" encoding="utf-8"?>
 <p1510:revInfo xmlns:a="http://schemas.openxmlformats.org/drawingml/2006/main" xmlns:r="http://schemas.openxmlformats.org/officeDocument/2006/relationships" xmlns:p1510="http://schemas.microsoft.com/office/powerpoint/2015/10/main">
   <p1510:revLst>
-    <p1510:client id="{ECA84D97-D422-4983-BFFB-C044D23D5B9C}" v="1" dt="2023-10-07T00:57:37.058"/>
+    <p1510:client id="{78B8B651-5DB9-439E-BC8D-3A018075F16F}" v="2" dt="2024-01-09T07:32:06.198"/>
   </p1510:revLst>
 </p1510:revInfo>
 </file>
@@ -365,6 +365,238 @@
       </pc:sldChg>
     </pc:docChg>
   </pc:docChgLst>
+  <pc:docChgLst>
+    <pc:chgData name="Tony Strasser" userId="4957b490a1ac7b63" providerId="LiveId" clId="{78B8B651-5DB9-439E-BC8D-3A018075F16F}"/>
+    <pc:docChg chg="modSld">
+      <pc:chgData name="Tony Strasser" userId="4957b490a1ac7b63" providerId="LiveId" clId="{78B8B651-5DB9-439E-BC8D-3A018075F16F}" dt="2024-01-09T07:32:06.198" v="45" actId="164"/>
+      <pc:docMkLst>
+        <pc:docMk/>
+      </pc:docMkLst>
+      <pc:sldChg chg="addSp delSp modSp mod">
+        <pc:chgData name="Tony Strasser" userId="4957b490a1ac7b63" providerId="LiveId" clId="{78B8B651-5DB9-439E-BC8D-3A018075F16F}" dt="2024-01-09T07:32:06.198" v="45" actId="164"/>
+        <pc:sldMkLst>
+          <pc:docMk/>
+          <pc:sldMk cId="633367735" sldId="256"/>
+        </pc:sldMkLst>
+        <pc:spChg chg="mod topLvl">
+          <ac:chgData name="Tony Strasser" userId="4957b490a1ac7b63" providerId="LiveId" clId="{78B8B651-5DB9-439E-BC8D-3A018075F16F}" dt="2024-01-09T07:32:06.198" v="45" actId="164"/>
+          <ac:spMkLst>
+            <pc:docMk/>
+            <pc:sldMk cId="633367735" sldId="256"/>
+            <ac:spMk id="6" creationId="{C5EB4318-36B0-805A-36DA-2F4BB59EBAD9}"/>
+          </ac:spMkLst>
+        </pc:spChg>
+        <pc:spChg chg="mod topLvl">
+          <ac:chgData name="Tony Strasser" userId="4957b490a1ac7b63" providerId="LiveId" clId="{78B8B651-5DB9-439E-BC8D-3A018075F16F}" dt="2024-01-09T07:32:06.198" v="45" actId="164"/>
+          <ac:spMkLst>
+            <pc:docMk/>
+            <pc:sldMk cId="633367735" sldId="256"/>
+            <ac:spMk id="7" creationId="{935C0525-577E-A927-2B3D-8AE0D16607E0}"/>
+          </ac:spMkLst>
+        </pc:spChg>
+        <pc:spChg chg="mod topLvl">
+          <ac:chgData name="Tony Strasser" userId="4957b490a1ac7b63" providerId="LiveId" clId="{78B8B651-5DB9-439E-BC8D-3A018075F16F}" dt="2024-01-09T07:32:06.198" v="45" actId="164"/>
+          <ac:spMkLst>
+            <pc:docMk/>
+            <pc:sldMk cId="633367735" sldId="256"/>
+            <ac:spMk id="8" creationId="{196576AA-0521-B24E-CACC-11BB288764E7}"/>
+          </ac:spMkLst>
+        </pc:spChg>
+        <pc:spChg chg="mod topLvl">
+          <ac:chgData name="Tony Strasser" userId="4957b490a1ac7b63" providerId="LiveId" clId="{78B8B651-5DB9-439E-BC8D-3A018075F16F}" dt="2024-01-09T07:32:06.198" v="45" actId="164"/>
+          <ac:spMkLst>
+            <pc:docMk/>
+            <pc:sldMk cId="633367735" sldId="256"/>
+            <ac:spMk id="9" creationId="{F8E32D86-31F3-4412-34C2-21D4D4A57B39}"/>
+          </ac:spMkLst>
+        </pc:spChg>
+        <pc:spChg chg="mod topLvl">
+          <ac:chgData name="Tony Strasser" userId="4957b490a1ac7b63" providerId="LiveId" clId="{78B8B651-5DB9-439E-BC8D-3A018075F16F}" dt="2024-01-09T07:32:06.198" v="45" actId="164"/>
+          <ac:spMkLst>
+            <pc:docMk/>
+            <pc:sldMk cId="633367735" sldId="256"/>
+            <ac:spMk id="10" creationId="{6B00699D-B042-79B2-BE1C-4F847AF707E3}"/>
+          </ac:spMkLst>
+        </pc:spChg>
+        <pc:spChg chg="mod topLvl">
+          <ac:chgData name="Tony Strasser" userId="4957b490a1ac7b63" providerId="LiveId" clId="{78B8B651-5DB9-439E-BC8D-3A018075F16F}" dt="2024-01-09T07:32:06.198" v="45" actId="164"/>
+          <ac:spMkLst>
+            <pc:docMk/>
+            <pc:sldMk cId="633367735" sldId="256"/>
+            <ac:spMk id="11" creationId="{2773A831-36C5-D6C9-1098-665A3E76CACF}"/>
+          </ac:spMkLst>
+        </pc:spChg>
+        <pc:spChg chg="mod topLvl">
+          <ac:chgData name="Tony Strasser" userId="4957b490a1ac7b63" providerId="LiveId" clId="{78B8B651-5DB9-439E-BC8D-3A018075F16F}" dt="2024-01-09T07:32:06.198" v="45" actId="164"/>
+          <ac:spMkLst>
+            <pc:docMk/>
+            <pc:sldMk cId="633367735" sldId="256"/>
+            <ac:spMk id="12" creationId="{4382A937-4BFB-F03A-09FD-E34FD135F8E6}"/>
+          </ac:spMkLst>
+        </pc:spChg>
+        <pc:spChg chg="mod topLvl">
+          <ac:chgData name="Tony Strasser" userId="4957b490a1ac7b63" providerId="LiveId" clId="{78B8B651-5DB9-439E-BC8D-3A018075F16F}" dt="2024-01-09T07:32:06.198" v="45" actId="164"/>
+          <ac:spMkLst>
+            <pc:docMk/>
+            <pc:sldMk cId="633367735" sldId="256"/>
+            <ac:spMk id="13" creationId="{88320358-976E-AD3E-7DEC-3474025ABB05}"/>
+          </ac:spMkLst>
+        </pc:spChg>
+        <pc:spChg chg="mod topLvl">
+          <ac:chgData name="Tony Strasser" userId="4957b490a1ac7b63" providerId="LiveId" clId="{78B8B651-5DB9-439E-BC8D-3A018075F16F}" dt="2024-01-09T07:32:06.198" v="45" actId="164"/>
+          <ac:spMkLst>
+            <pc:docMk/>
+            <pc:sldMk cId="633367735" sldId="256"/>
+            <ac:spMk id="14" creationId="{7AE5DF70-649C-0645-6DA0-D661E8FB30C2}"/>
+          </ac:spMkLst>
+        </pc:spChg>
+        <pc:spChg chg="mod topLvl">
+          <ac:chgData name="Tony Strasser" userId="4957b490a1ac7b63" providerId="LiveId" clId="{78B8B651-5DB9-439E-BC8D-3A018075F16F}" dt="2024-01-09T07:32:06.198" v="45" actId="164"/>
+          <ac:spMkLst>
+            <pc:docMk/>
+            <pc:sldMk cId="633367735" sldId="256"/>
+            <ac:spMk id="15" creationId="{E80EC256-7E24-37AE-03FA-C30A61F3DBE7}"/>
+          </ac:spMkLst>
+        </pc:spChg>
+        <pc:spChg chg="mod topLvl">
+          <ac:chgData name="Tony Strasser" userId="4957b490a1ac7b63" providerId="LiveId" clId="{78B8B651-5DB9-439E-BC8D-3A018075F16F}" dt="2024-01-09T07:32:06.198" v="45" actId="164"/>
+          <ac:spMkLst>
+            <pc:docMk/>
+            <pc:sldMk cId="633367735" sldId="256"/>
+            <ac:spMk id="16" creationId="{1CC849B4-2C7B-8229-19E0-B38254DAF98F}"/>
+          </ac:spMkLst>
+        </pc:spChg>
+        <pc:spChg chg="mod topLvl">
+          <ac:chgData name="Tony Strasser" userId="4957b490a1ac7b63" providerId="LiveId" clId="{78B8B651-5DB9-439E-BC8D-3A018075F16F}" dt="2024-01-09T07:32:06.198" v="45" actId="164"/>
+          <ac:spMkLst>
+            <pc:docMk/>
+            <pc:sldMk cId="633367735" sldId="256"/>
+            <ac:spMk id="17" creationId="{10092EF8-90FB-3343-5538-3013AE4C9953}"/>
+          </ac:spMkLst>
+        </pc:spChg>
+        <pc:spChg chg="mod topLvl">
+          <ac:chgData name="Tony Strasser" userId="4957b490a1ac7b63" providerId="LiveId" clId="{78B8B651-5DB9-439E-BC8D-3A018075F16F}" dt="2024-01-09T07:32:06.198" v="45" actId="164"/>
+          <ac:spMkLst>
+            <pc:docMk/>
+            <pc:sldMk cId="633367735" sldId="256"/>
+            <ac:spMk id="18" creationId="{63307696-0640-5E49-158A-7324CCD2E459}"/>
+          </ac:spMkLst>
+        </pc:spChg>
+        <pc:spChg chg="mod topLvl">
+          <ac:chgData name="Tony Strasser" userId="4957b490a1ac7b63" providerId="LiveId" clId="{78B8B651-5DB9-439E-BC8D-3A018075F16F}" dt="2024-01-09T07:32:06.198" v="45" actId="164"/>
+          <ac:spMkLst>
+            <pc:docMk/>
+            <pc:sldMk cId="633367735" sldId="256"/>
+            <ac:spMk id="19" creationId="{DC652F8F-0664-96B8-CEBE-450A0AE5DECD}"/>
+          </ac:spMkLst>
+        </pc:spChg>
+        <pc:spChg chg="mod topLvl">
+          <ac:chgData name="Tony Strasser" userId="4957b490a1ac7b63" providerId="LiveId" clId="{78B8B651-5DB9-439E-BC8D-3A018075F16F}" dt="2024-01-09T07:32:06.198" v="45" actId="164"/>
+          <ac:spMkLst>
+            <pc:docMk/>
+            <pc:sldMk cId="633367735" sldId="256"/>
+            <ac:spMk id="20" creationId="{BDCD705D-7DB4-0DC3-ADD6-5CF0D544C352}"/>
+          </ac:spMkLst>
+        </pc:spChg>
+        <pc:spChg chg="mod topLvl">
+          <ac:chgData name="Tony Strasser" userId="4957b490a1ac7b63" providerId="LiveId" clId="{78B8B651-5DB9-439E-BC8D-3A018075F16F}" dt="2024-01-09T07:32:06.198" v="45" actId="164"/>
+          <ac:spMkLst>
+            <pc:docMk/>
+            <pc:sldMk cId="633367735" sldId="256"/>
+            <ac:spMk id="21" creationId="{64FC0248-7F1F-5B5F-28DB-C76D9EEF3BC6}"/>
+          </ac:spMkLst>
+        </pc:spChg>
+        <pc:spChg chg="mod topLvl">
+          <ac:chgData name="Tony Strasser" userId="4957b490a1ac7b63" providerId="LiveId" clId="{78B8B651-5DB9-439E-BC8D-3A018075F16F}" dt="2024-01-09T07:32:06.198" v="45" actId="164"/>
+          <ac:spMkLst>
+            <pc:docMk/>
+            <pc:sldMk cId="633367735" sldId="256"/>
+            <ac:spMk id="22" creationId="{489E3E22-9AE1-482F-F0B5-A7F15AE29657}"/>
+          </ac:spMkLst>
+        </pc:spChg>
+        <pc:spChg chg="mod topLvl">
+          <ac:chgData name="Tony Strasser" userId="4957b490a1ac7b63" providerId="LiveId" clId="{78B8B651-5DB9-439E-BC8D-3A018075F16F}" dt="2024-01-09T07:32:06.198" v="45" actId="164"/>
+          <ac:spMkLst>
+            <pc:docMk/>
+            <pc:sldMk cId="633367735" sldId="256"/>
+            <ac:spMk id="23" creationId="{52DC7B99-5BB1-0A96-DEDD-064A0764271D}"/>
+          </ac:spMkLst>
+        </pc:spChg>
+        <pc:spChg chg="mod topLvl">
+          <ac:chgData name="Tony Strasser" userId="4957b490a1ac7b63" providerId="LiveId" clId="{78B8B651-5DB9-439E-BC8D-3A018075F16F}" dt="2024-01-09T07:32:06.198" v="45" actId="164"/>
+          <ac:spMkLst>
+            <pc:docMk/>
+            <pc:sldMk cId="633367735" sldId="256"/>
+            <ac:spMk id="24" creationId="{069F9BA2-8EDB-9575-5553-F549E5F2FB99}"/>
+          </ac:spMkLst>
+        </pc:spChg>
+        <pc:spChg chg="mod topLvl">
+          <ac:chgData name="Tony Strasser" userId="4957b490a1ac7b63" providerId="LiveId" clId="{78B8B651-5DB9-439E-BC8D-3A018075F16F}" dt="2024-01-09T07:32:06.198" v="45" actId="164"/>
+          <ac:spMkLst>
+            <pc:docMk/>
+            <pc:sldMk cId="633367735" sldId="256"/>
+            <ac:spMk id="25" creationId="{63842EFD-8AE3-AE7E-6AB7-C0112F44AFC5}"/>
+          </ac:spMkLst>
+        </pc:spChg>
+        <pc:spChg chg="mod topLvl">
+          <ac:chgData name="Tony Strasser" userId="4957b490a1ac7b63" providerId="LiveId" clId="{78B8B651-5DB9-439E-BC8D-3A018075F16F}" dt="2024-01-09T07:32:06.198" v="45" actId="164"/>
+          <ac:spMkLst>
+            <pc:docMk/>
+            <pc:sldMk cId="633367735" sldId="256"/>
+            <ac:spMk id="26" creationId="{45EE150A-17A7-84F8-64DB-C36848514E72}"/>
+          </ac:spMkLst>
+        </pc:spChg>
+        <pc:spChg chg="mod topLvl">
+          <ac:chgData name="Tony Strasser" userId="4957b490a1ac7b63" providerId="LiveId" clId="{78B8B651-5DB9-439E-BC8D-3A018075F16F}" dt="2024-01-09T07:32:06.198" v="45" actId="164"/>
+          <ac:spMkLst>
+            <pc:docMk/>
+            <pc:sldMk cId="633367735" sldId="256"/>
+            <ac:spMk id="27" creationId="{209464D0-2681-68A7-C0DF-64FFF5762775}"/>
+          </ac:spMkLst>
+        </pc:spChg>
+        <pc:spChg chg="mod topLvl">
+          <ac:chgData name="Tony Strasser" userId="4957b490a1ac7b63" providerId="LiveId" clId="{78B8B651-5DB9-439E-BC8D-3A018075F16F}" dt="2024-01-09T07:32:06.198" v="45" actId="164"/>
+          <ac:spMkLst>
+            <pc:docMk/>
+            <pc:sldMk cId="633367735" sldId="256"/>
+            <ac:spMk id="28" creationId="{3A7E4604-EA3F-50D4-0236-A4C821190467}"/>
+          </ac:spMkLst>
+        </pc:spChg>
+        <pc:spChg chg="mod topLvl">
+          <ac:chgData name="Tony Strasser" userId="4957b490a1ac7b63" providerId="LiveId" clId="{78B8B651-5DB9-439E-BC8D-3A018075F16F}" dt="2024-01-09T07:32:06.198" v="45" actId="164"/>
+          <ac:spMkLst>
+            <pc:docMk/>
+            <pc:sldMk cId="633367735" sldId="256"/>
+            <ac:spMk id="29" creationId="{AD6FEC21-4ADD-AD78-9E8A-6ED58CA7307A}"/>
+          </ac:spMkLst>
+        </pc:spChg>
+        <pc:grpChg chg="add mod">
+          <ac:chgData name="Tony Strasser" userId="4957b490a1ac7b63" providerId="LiveId" clId="{78B8B651-5DB9-439E-BC8D-3A018075F16F}" dt="2024-01-09T07:32:06.198" v="45" actId="164"/>
+          <ac:grpSpMkLst>
+            <pc:docMk/>
+            <pc:sldMk cId="633367735" sldId="256"/>
+            <ac:grpSpMk id="2" creationId="{F2CE5E5B-0DCC-5D82-4F12-7FC098999A59}"/>
+          </ac:grpSpMkLst>
+        </pc:grpChg>
+        <pc:grpChg chg="del">
+          <ac:chgData name="Tony Strasser" userId="4957b490a1ac7b63" providerId="LiveId" clId="{78B8B651-5DB9-439E-BC8D-3A018075F16F}" dt="2024-01-09T07:30:20.098" v="0" actId="165"/>
+          <ac:grpSpMkLst>
+            <pc:docMk/>
+            <pc:sldMk cId="633367735" sldId="256"/>
+            <ac:grpSpMk id="30" creationId="{DB7B8FAA-2E12-0DFE-929C-1973498252D3}"/>
+          </ac:grpSpMkLst>
+        </pc:grpChg>
+        <pc:picChg chg="mod topLvl">
+          <ac:chgData name="Tony Strasser" userId="4957b490a1ac7b63" providerId="LiveId" clId="{78B8B651-5DB9-439E-BC8D-3A018075F16F}" dt="2024-01-09T07:32:06.198" v="45" actId="164"/>
+          <ac:picMkLst>
+            <pc:docMk/>
+            <pc:sldMk cId="633367735" sldId="256"/>
+            <ac:picMk id="5" creationId="{327467B5-8CC2-6BCB-9232-4DCCF30A9A15}"/>
+          </ac:picMkLst>
+        </pc:picChg>
+      </pc:sldChg>
+    </pc:docChg>
+  </pc:docChgLst>
 </pc:chgInfo>
 </file>
 
@@ -517,7 +749,7 @@
           <a:p>
             <a:fld id="{1C85E7D2-0D4B-4CBD-9C3E-4AB330E2219F}" type="datetimeFigureOut">
               <a:rPr lang="en-AU" smtClean="0"/>
-              <a:t>9/10/2023</a:t>
+              <a:t>9/01/2024</a:t>
             </a:fld>
             <a:endParaRPr lang="en-AU"/>
           </a:p>
@@ -717,7 +949,7 @@
           <a:p>
             <a:fld id="{1C85E7D2-0D4B-4CBD-9C3E-4AB330E2219F}" type="datetimeFigureOut">
               <a:rPr lang="en-AU" smtClean="0"/>
-              <a:t>9/10/2023</a:t>
+              <a:t>9/01/2024</a:t>
             </a:fld>
             <a:endParaRPr lang="en-AU"/>
           </a:p>
@@ -927,7 +1159,7 @@
           <a:p>
             <a:fld id="{1C85E7D2-0D4B-4CBD-9C3E-4AB330E2219F}" type="datetimeFigureOut">
               <a:rPr lang="en-AU" smtClean="0"/>
-              <a:t>9/10/2023</a:t>
+              <a:t>9/01/2024</a:t>
             </a:fld>
             <a:endParaRPr lang="en-AU"/>
           </a:p>
@@ -1127,7 +1359,7 @@
           <a:p>
             <a:fld id="{1C85E7D2-0D4B-4CBD-9C3E-4AB330E2219F}" type="datetimeFigureOut">
               <a:rPr lang="en-AU" smtClean="0"/>
-              <a:t>9/10/2023</a:t>
+              <a:t>9/01/2024</a:t>
             </a:fld>
             <a:endParaRPr lang="en-AU"/>
           </a:p>
@@ -1403,7 +1635,7 @@
           <a:p>
             <a:fld id="{1C85E7D2-0D4B-4CBD-9C3E-4AB330E2219F}" type="datetimeFigureOut">
               <a:rPr lang="en-AU" smtClean="0"/>
-              <a:t>9/10/2023</a:t>
+              <a:t>9/01/2024</a:t>
             </a:fld>
             <a:endParaRPr lang="en-AU"/>
           </a:p>
@@ -1671,7 +1903,7 @@
           <a:p>
             <a:fld id="{1C85E7D2-0D4B-4CBD-9C3E-4AB330E2219F}" type="datetimeFigureOut">
               <a:rPr lang="en-AU" smtClean="0"/>
-              <a:t>9/10/2023</a:t>
+              <a:t>9/01/2024</a:t>
             </a:fld>
             <a:endParaRPr lang="en-AU"/>
           </a:p>
@@ -2086,7 +2318,7 @@
           <a:p>
             <a:fld id="{1C85E7D2-0D4B-4CBD-9C3E-4AB330E2219F}" type="datetimeFigureOut">
               <a:rPr lang="en-AU" smtClean="0"/>
-              <a:t>9/10/2023</a:t>
+              <a:t>9/01/2024</a:t>
             </a:fld>
             <a:endParaRPr lang="en-AU"/>
           </a:p>
@@ -2228,7 +2460,7 @@
           <a:p>
             <a:fld id="{1C85E7D2-0D4B-4CBD-9C3E-4AB330E2219F}" type="datetimeFigureOut">
               <a:rPr lang="en-AU" smtClean="0"/>
-              <a:t>9/10/2023</a:t>
+              <a:t>9/01/2024</a:t>
             </a:fld>
             <a:endParaRPr lang="en-AU"/>
           </a:p>
@@ -2341,7 +2573,7 @@
           <a:p>
             <a:fld id="{1C85E7D2-0D4B-4CBD-9C3E-4AB330E2219F}" type="datetimeFigureOut">
               <a:rPr lang="en-AU" smtClean="0"/>
-              <a:t>9/10/2023</a:t>
+              <a:t>9/01/2024</a:t>
             </a:fld>
             <a:endParaRPr lang="en-AU"/>
           </a:p>
@@ -2654,7 +2886,7 @@
           <a:p>
             <a:fld id="{1C85E7D2-0D4B-4CBD-9C3E-4AB330E2219F}" type="datetimeFigureOut">
               <a:rPr lang="en-AU" smtClean="0"/>
-              <a:t>9/10/2023</a:t>
+              <a:t>9/01/2024</a:t>
             </a:fld>
             <a:endParaRPr lang="en-AU"/>
           </a:p>
@@ -2943,7 +3175,7 @@
           <a:p>
             <a:fld id="{1C85E7D2-0D4B-4CBD-9C3E-4AB330E2219F}" type="datetimeFigureOut">
               <a:rPr lang="en-AU" smtClean="0"/>
-              <a:t>9/10/2023</a:t>
+              <a:t>9/01/2024</a:t>
             </a:fld>
             <a:endParaRPr lang="en-AU"/>
           </a:p>
@@ -3186,7 +3418,7 @@
           <a:p>
             <a:fld id="{1C85E7D2-0D4B-4CBD-9C3E-4AB330E2219F}" type="datetimeFigureOut">
               <a:rPr lang="en-AU" smtClean="0"/>
-              <a:t>9/10/2023</a:t>
+              <a:t>9/01/2024</a:t>
             </a:fld>
             <a:endParaRPr lang="en-AU"/>
           </a:p>
@@ -3605,10 +3837,10 @@
       </p:grpSpPr>
       <p:grpSp>
         <p:nvGrpSpPr>
-          <p:cNvPr id="30" name="Group 29">
-            <a:extLst>
-              <a:ext uri="{FF2B5EF4-FFF2-40B4-BE49-F238E27FC236}">
-                <a16:creationId xmlns:a16="http://schemas.microsoft.com/office/drawing/2014/main" id="{DB7B8FAA-2E12-0DFE-929C-1973498252D3}"/>
+          <p:cNvPr id="2" name="Group 1">
+            <a:extLst>
+              <a:ext uri="{FF2B5EF4-FFF2-40B4-BE49-F238E27FC236}">
+                <a16:creationId xmlns:a16="http://schemas.microsoft.com/office/drawing/2014/main" id="{F2CE5E5B-0DCC-5D82-4F12-7FC098999A59}"/>
               </a:ext>
             </a:extLst>
           </p:cNvPr>
@@ -3618,14 +3850,14 @@
         <p:grpSpPr>
           <a:xfrm>
             <a:off x="880915" y="102610"/>
-            <a:ext cx="10784881" cy="6504252"/>
+            <a:ext cx="10784881" cy="5073186"/>
             <a:chOff x="880915" y="102610"/>
-            <a:chExt cx="10784881" cy="6504252"/>
+            <a:chExt cx="10784881" cy="5073186"/>
           </a:xfrm>
         </p:grpSpPr>
         <p:pic>
           <p:nvPicPr>
-            <p:cNvPr id="5" name="Picture 4" descr="A screenshot of a computer&#10;&#10;Description automatically generated">
+            <p:cNvPr id="5" name="Picture 4">
               <a:extLst>
                 <a:ext uri="{FF2B5EF4-FFF2-40B4-BE49-F238E27FC236}">
                   <a16:creationId xmlns:a16="http://schemas.microsoft.com/office/drawing/2014/main" id="{327467B5-8CC2-6BCB-9232-4DCCF30A9A15}"/>
@@ -3645,14 +3877,13 @@
                 </a:ext>
               </a:extLst>
             </a:blip>
-            <a:stretch>
-              <a:fillRect/>
-            </a:stretch>
+            <a:srcRect/>
+            <a:stretch/>
           </p:blipFill>
           <p:spPr>
             <a:xfrm>
-              <a:off x="2347642" y="154547"/>
-              <a:ext cx="7496715" cy="6452315"/>
+              <a:off x="2345496" y="206574"/>
+              <a:ext cx="7496715" cy="4969222"/>
             </a:xfrm>
             <a:prstGeom prst="rect">
               <a:avLst/>
@@ -3930,7 +4161,7 @@
           </p:nvSpPr>
           <p:spPr>
             <a:xfrm>
-              <a:off x="5476151" y="2606948"/>
+              <a:off x="5474004" y="2283782"/>
               <a:ext cx="1239698" cy="369332"/>
             </a:xfrm>
             <a:prstGeom prst="rect">
@@ -3965,7 +4196,7 @@
           </p:nvSpPr>
           <p:spPr>
             <a:xfrm>
-              <a:off x="7357561" y="5093524"/>
+              <a:off x="7357561" y="3760566"/>
               <a:ext cx="1416606" cy="369332"/>
             </a:xfrm>
             <a:prstGeom prst="rect">
@@ -4000,7 +4231,7 @@
           </p:nvSpPr>
           <p:spPr>
             <a:xfrm>
-              <a:off x="8774806" y="5181599"/>
+              <a:off x="8774806" y="3848641"/>
               <a:ext cx="360609" cy="193183"/>
             </a:xfrm>
             <a:prstGeom prst="rightArrow">
@@ -4046,7 +4277,7 @@
           </p:nvSpPr>
           <p:spPr>
             <a:xfrm>
-              <a:off x="7403182" y="5462856"/>
+              <a:off x="7403182" y="4129898"/>
               <a:ext cx="1325363" cy="369332"/>
             </a:xfrm>
             <a:prstGeom prst="rect">
@@ -4081,7 +4312,7 @@
           </p:nvSpPr>
           <p:spPr>
             <a:xfrm>
-              <a:off x="8774806" y="5550931"/>
+              <a:off x="8774806" y="4217973"/>
               <a:ext cx="360609" cy="193183"/>
             </a:xfrm>
             <a:prstGeom prst="rightArrow">
@@ -4127,7 +4358,7 @@
           </p:nvSpPr>
           <p:spPr>
             <a:xfrm>
-              <a:off x="8082246" y="5920263"/>
+              <a:off x="8082246" y="4587305"/>
               <a:ext cx="691921" cy="369332"/>
             </a:xfrm>
             <a:prstGeom prst="rect">
@@ -4162,7 +4393,7 @@
           </p:nvSpPr>
           <p:spPr>
             <a:xfrm>
-              <a:off x="8774806" y="6008338"/>
+              <a:off x="8774806" y="4675380"/>
               <a:ext cx="360609" cy="193183"/>
             </a:xfrm>
             <a:prstGeom prst="rightArrow">
@@ -4208,7 +4439,7 @@
           </p:nvSpPr>
           <p:spPr>
             <a:xfrm>
-              <a:off x="6365005" y="4076437"/>
+              <a:off x="6365005" y="2743479"/>
               <a:ext cx="1171283" cy="369332"/>
             </a:xfrm>
             <a:prstGeom prst="rect">
@@ -4243,7 +4474,7 @@
           </p:nvSpPr>
           <p:spPr>
             <a:xfrm>
-              <a:off x="7536289" y="4164512"/>
+              <a:off x="7536289" y="2831554"/>
               <a:ext cx="1893194" cy="193183"/>
             </a:xfrm>
             <a:prstGeom prst="rightArrow">
@@ -4289,8 +4520,8 @@
           </p:nvSpPr>
           <p:spPr>
             <a:xfrm rot="5400000">
-              <a:off x="6065451" y="5278191"/>
-              <a:ext cx="1893194" cy="193183"/>
+              <a:off x="6124699" y="3866668"/>
+              <a:ext cx="1773337" cy="230458"/>
             </a:xfrm>
             <a:prstGeom prst="rightArrow">
               <a:avLst/>

</xml_diff>

<commit_message>
Updates for KookaBlockly v1.10.0
</commit_message>
<xml_diff>
--- a/docs/source/images/kookablockly_display.pptx
+++ b/docs/source/images/kookablockly_display.pptx
@@ -127,7 +127,7 @@
 <file path=ppt/revisionInfo.xml><?xml version="1.0" encoding="utf-8"?>
 <p1510:revInfo xmlns:a="http://schemas.openxmlformats.org/drawingml/2006/main" xmlns:r="http://schemas.openxmlformats.org/officeDocument/2006/relationships" xmlns:p1510="http://schemas.microsoft.com/office/powerpoint/2015/10/main">
   <p1510:revLst>
-    <p1510:client id="{78B8B651-5DB9-439E-BC8D-3A018075F16F}" v="2" dt="2024-01-09T07:32:06.198"/>
+    <p1510:client id="{78B8B651-5DB9-439E-BC8D-3A018075F16F}" v="6" dt="2024-01-21T01:00:25.600"/>
   </p1510:revLst>
 </p1510:revInfo>
 </file>
@@ -368,18 +368,18 @@
   <pc:docChgLst>
     <pc:chgData name="Tony Strasser" userId="4957b490a1ac7b63" providerId="LiveId" clId="{78B8B651-5DB9-439E-BC8D-3A018075F16F}"/>
     <pc:docChg chg="modSld">
-      <pc:chgData name="Tony Strasser" userId="4957b490a1ac7b63" providerId="LiveId" clId="{78B8B651-5DB9-439E-BC8D-3A018075F16F}" dt="2024-01-09T07:32:06.198" v="45" actId="164"/>
+      <pc:chgData name="Tony Strasser" userId="4957b490a1ac7b63" providerId="LiveId" clId="{78B8B651-5DB9-439E-BC8D-3A018075F16F}" dt="2024-01-21T01:00:25.600" v="64" actId="164"/>
       <pc:docMkLst>
         <pc:docMk/>
       </pc:docMkLst>
       <pc:sldChg chg="addSp delSp modSp mod">
-        <pc:chgData name="Tony Strasser" userId="4957b490a1ac7b63" providerId="LiveId" clId="{78B8B651-5DB9-439E-BC8D-3A018075F16F}" dt="2024-01-09T07:32:06.198" v="45" actId="164"/>
+        <pc:chgData name="Tony Strasser" userId="4957b490a1ac7b63" providerId="LiveId" clId="{78B8B651-5DB9-439E-BC8D-3A018075F16F}" dt="2024-01-21T01:00:25.600" v="64" actId="164"/>
         <pc:sldMkLst>
           <pc:docMk/>
           <pc:sldMk cId="633367735" sldId="256"/>
         </pc:sldMkLst>
         <pc:spChg chg="mod topLvl">
-          <ac:chgData name="Tony Strasser" userId="4957b490a1ac7b63" providerId="LiveId" clId="{78B8B651-5DB9-439E-BC8D-3A018075F16F}" dt="2024-01-09T07:32:06.198" v="45" actId="164"/>
+          <ac:chgData name="Tony Strasser" userId="4957b490a1ac7b63" providerId="LiveId" clId="{78B8B651-5DB9-439E-BC8D-3A018075F16F}" dt="2024-01-21T01:00:25.600" v="64" actId="164"/>
           <ac:spMkLst>
             <pc:docMk/>
             <pc:sldMk cId="633367735" sldId="256"/>
@@ -387,7 +387,7 @@
           </ac:spMkLst>
         </pc:spChg>
         <pc:spChg chg="mod topLvl">
-          <ac:chgData name="Tony Strasser" userId="4957b490a1ac7b63" providerId="LiveId" clId="{78B8B651-5DB9-439E-BC8D-3A018075F16F}" dt="2024-01-09T07:32:06.198" v="45" actId="164"/>
+          <ac:chgData name="Tony Strasser" userId="4957b490a1ac7b63" providerId="LiveId" clId="{78B8B651-5DB9-439E-BC8D-3A018075F16F}" dt="2024-01-21T01:00:25.600" v="64" actId="164"/>
           <ac:spMkLst>
             <pc:docMk/>
             <pc:sldMk cId="633367735" sldId="256"/>
@@ -395,7 +395,7 @@
           </ac:spMkLst>
         </pc:spChg>
         <pc:spChg chg="mod topLvl">
-          <ac:chgData name="Tony Strasser" userId="4957b490a1ac7b63" providerId="LiveId" clId="{78B8B651-5DB9-439E-BC8D-3A018075F16F}" dt="2024-01-09T07:32:06.198" v="45" actId="164"/>
+          <ac:chgData name="Tony Strasser" userId="4957b490a1ac7b63" providerId="LiveId" clId="{78B8B651-5DB9-439E-BC8D-3A018075F16F}" dt="2024-01-21T01:00:25.600" v="64" actId="164"/>
           <ac:spMkLst>
             <pc:docMk/>
             <pc:sldMk cId="633367735" sldId="256"/>
@@ -403,7 +403,7 @@
           </ac:spMkLst>
         </pc:spChg>
         <pc:spChg chg="mod topLvl">
-          <ac:chgData name="Tony Strasser" userId="4957b490a1ac7b63" providerId="LiveId" clId="{78B8B651-5DB9-439E-BC8D-3A018075F16F}" dt="2024-01-09T07:32:06.198" v="45" actId="164"/>
+          <ac:chgData name="Tony Strasser" userId="4957b490a1ac7b63" providerId="LiveId" clId="{78B8B651-5DB9-439E-BC8D-3A018075F16F}" dt="2024-01-21T01:00:25.600" v="64" actId="164"/>
           <ac:spMkLst>
             <pc:docMk/>
             <pc:sldMk cId="633367735" sldId="256"/>
@@ -411,7 +411,7 @@
           </ac:spMkLst>
         </pc:spChg>
         <pc:spChg chg="mod topLvl">
-          <ac:chgData name="Tony Strasser" userId="4957b490a1ac7b63" providerId="LiveId" clId="{78B8B651-5DB9-439E-BC8D-3A018075F16F}" dt="2024-01-09T07:32:06.198" v="45" actId="164"/>
+          <ac:chgData name="Tony Strasser" userId="4957b490a1ac7b63" providerId="LiveId" clId="{78B8B651-5DB9-439E-BC8D-3A018075F16F}" dt="2024-01-21T01:00:25.600" v="64" actId="164"/>
           <ac:spMkLst>
             <pc:docMk/>
             <pc:sldMk cId="633367735" sldId="256"/>
@@ -419,7 +419,7 @@
           </ac:spMkLst>
         </pc:spChg>
         <pc:spChg chg="mod topLvl">
-          <ac:chgData name="Tony Strasser" userId="4957b490a1ac7b63" providerId="LiveId" clId="{78B8B651-5DB9-439E-BC8D-3A018075F16F}" dt="2024-01-09T07:32:06.198" v="45" actId="164"/>
+          <ac:chgData name="Tony Strasser" userId="4957b490a1ac7b63" providerId="LiveId" clId="{78B8B651-5DB9-439E-BC8D-3A018075F16F}" dt="2024-01-21T01:00:25.600" v="64" actId="164"/>
           <ac:spMkLst>
             <pc:docMk/>
             <pc:sldMk cId="633367735" sldId="256"/>
@@ -427,7 +427,7 @@
           </ac:spMkLst>
         </pc:spChg>
         <pc:spChg chg="mod topLvl">
-          <ac:chgData name="Tony Strasser" userId="4957b490a1ac7b63" providerId="LiveId" clId="{78B8B651-5DB9-439E-BC8D-3A018075F16F}" dt="2024-01-09T07:32:06.198" v="45" actId="164"/>
+          <ac:chgData name="Tony Strasser" userId="4957b490a1ac7b63" providerId="LiveId" clId="{78B8B651-5DB9-439E-BC8D-3A018075F16F}" dt="2024-01-21T01:00:25.600" v="64" actId="164"/>
           <ac:spMkLst>
             <pc:docMk/>
             <pc:sldMk cId="633367735" sldId="256"/>
@@ -435,7 +435,7 @@
           </ac:spMkLst>
         </pc:spChg>
         <pc:spChg chg="mod topLvl">
-          <ac:chgData name="Tony Strasser" userId="4957b490a1ac7b63" providerId="LiveId" clId="{78B8B651-5DB9-439E-BC8D-3A018075F16F}" dt="2024-01-09T07:32:06.198" v="45" actId="164"/>
+          <ac:chgData name="Tony Strasser" userId="4957b490a1ac7b63" providerId="LiveId" clId="{78B8B651-5DB9-439E-BC8D-3A018075F16F}" dt="2024-01-21T01:00:25.600" v="64" actId="164"/>
           <ac:spMkLst>
             <pc:docMk/>
             <pc:sldMk cId="633367735" sldId="256"/>
@@ -443,7 +443,7 @@
           </ac:spMkLst>
         </pc:spChg>
         <pc:spChg chg="mod topLvl">
-          <ac:chgData name="Tony Strasser" userId="4957b490a1ac7b63" providerId="LiveId" clId="{78B8B651-5DB9-439E-BC8D-3A018075F16F}" dt="2024-01-09T07:32:06.198" v="45" actId="164"/>
+          <ac:chgData name="Tony Strasser" userId="4957b490a1ac7b63" providerId="LiveId" clId="{78B8B651-5DB9-439E-BC8D-3A018075F16F}" dt="2024-01-21T01:00:25.600" v="64" actId="164"/>
           <ac:spMkLst>
             <pc:docMk/>
             <pc:sldMk cId="633367735" sldId="256"/>
@@ -451,7 +451,7 @@
           </ac:spMkLst>
         </pc:spChg>
         <pc:spChg chg="mod topLvl">
-          <ac:chgData name="Tony Strasser" userId="4957b490a1ac7b63" providerId="LiveId" clId="{78B8B651-5DB9-439E-BC8D-3A018075F16F}" dt="2024-01-09T07:32:06.198" v="45" actId="164"/>
+          <ac:chgData name="Tony Strasser" userId="4957b490a1ac7b63" providerId="LiveId" clId="{78B8B651-5DB9-439E-BC8D-3A018075F16F}" dt="2024-01-21T01:00:25.600" v="64" actId="164"/>
           <ac:spMkLst>
             <pc:docMk/>
             <pc:sldMk cId="633367735" sldId="256"/>
@@ -459,7 +459,7 @@
           </ac:spMkLst>
         </pc:spChg>
         <pc:spChg chg="mod topLvl">
-          <ac:chgData name="Tony Strasser" userId="4957b490a1ac7b63" providerId="LiveId" clId="{78B8B651-5DB9-439E-BC8D-3A018075F16F}" dt="2024-01-09T07:32:06.198" v="45" actId="164"/>
+          <ac:chgData name="Tony Strasser" userId="4957b490a1ac7b63" providerId="LiveId" clId="{78B8B651-5DB9-439E-BC8D-3A018075F16F}" dt="2024-01-21T01:00:25.600" v="64" actId="164"/>
           <ac:spMkLst>
             <pc:docMk/>
             <pc:sldMk cId="633367735" sldId="256"/>
@@ -467,7 +467,7 @@
           </ac:spMkLst>
         </pc:spChg>
         <pc:spChg chg="mod topLvl">
-          <ac:chgData name="Tony Strasser" userId="4957b490a1ac7b63" providerId="LiveId" clId="{78B8B651-5DB9-439E-BC8D-3A018075F16F}" dt="2024-01-09T07:32:06.198" v="45" actId="164"/>
+          <ac:chgData name="Tony Strasser" userId="4957b490a1ac7b63" providerId="LiveId" clId="{78B8B651-5DB9-439E-BC8D-3A018075F16F}" dt="2024-01-21T01:00:25.600" v="64" actId="164"/>
           <ac:spMkLst>
             <pc:docMk/>
             <pc:sldMk cId="633367735" sldId="256"/>
@@ -475,7 +475,7 @@
           </ac:spMkLst>
         </pc:spChg>
         <pc:spChg chg="mod topLvl">
-          <ac:chgData name="Tony Strasser" userId="4957b490a1ac7b63" providerId="LiveId" clId="{78B8B651-5DB9-439E-BC8D-3A018075F16F}" dt="2024-01-09T07:32:06.198" v="45" actId="164"/>
+          <ac:chgData name="Tony Strasser" userId="4957b490a1ac7b63" providerId="LiveId" clId="{78B8B651-5DB9-439E-BC8D-3A018075F16F}" dt="2024-01-21T01:00:25.600" v="64" actId="164"/>
           <ac:spMkLst>
             <pc:docMk/>
             <pc:sldMk cId="633367735" sldId="256"/>
@@ -483,7 +483,7 @@
           </ac:spMkLst>
         </pc:spChg>
         <pc:spChg chg="mod topLvl">
-          <ac:chgData name="Tony Strasser" userId="4957b490a1ac7b63" providerId="LiveId" clId="{78B8B651-5DB9-439E-BC8D-3A018075F16F}" dt="2024-01-09T07:32:06.198" v="45" actId="164"/>
+          <ac:chgData name="Tony Strasser" userId="4957b490a1ac7b63" providerId="LiveId" clId="{78B8B651-5DB9-439E-BC8D-3A018075F16F}" dt="2024-01-21T01:00:25.600" v="64" actId="164"/>
           <ac:spMkLst>
             <pc:docMk/>
             <pc:sldMk cId="633367735" sldId="256"/>
@@ -491,7 +491,7 @@
           </ac:spMkLst>
         </pc:spChg>
         <pc:spChg chg="mod topLvl">
-          <ac:chgData name="Tony Strasser" userId="4957b490a1ac7b63" providerId="LiveId" clId="{78B8B651-5DB9-439E-BC8D-3A018075F16F}" dt="2024-01-09T07:32:06.198" v="45" actId="164"/>
+          <ac:chgData name="Tony Strasser" userId="4957b490a1ac7b63" providerId="LiveId" clId="{78B8B651-5DB9-439E-BC8D-3A018075F16F}" dt="2024-01-21T01:00:25.600" v="64" actId="164"/>
           <ac:spMkLst>
             <pc:docMk/>
             <pc:sldMk cId="633367735" sldId="256"/>
@@ -499,7 +499,7 @@
           </ac:spMkLst>
         </pc:spChg>
         <pc:spChg chg="mod topLvl">
-          <ac:chgData name="Tony Strasser" userId="4957b490a1ac7b63" providerId="LiveId" clId="{78B8B651-5DB9-439E-BC8D-3A018075F16F}" dt="2024-01-09T07:32:06.198" v="45" actId="164"/>
+          <ac:chgData name="Tony Strasser" userId="4957b490a1ac7b63" providerId="LiveId" clId="{78B8B651-5DB9-439E-BC8D-3A018075F16F}" dt="2024-01-21T01:00:25.600" v="64" actId="164"/>
           <ac:spMkLst>
             <pc:docMk/>
             <pc:sldMk cId="633367735" sldId="256"/>
@@ -507,7 +507,7 @@
           </ac:spMkLst>
         </pc:spChg>
         <pc:spChg chg="mod topLvl">
-          <ac:chgData name="Tony Strasser" userId="4957b490a1ac7b63" providerId="LiveId" clId="{78B8B651-5DB9-439E-BC8D-3A018075F16F}" dt="2024-01-09T07:32:06.198" v="45" actId="164"/>
+          <ac:chgData name="Tony Strasser" userId="4957b490a1ac7b63" providerId="LiveId" clId="{78B8B651-5DB9-439E-BC8D-3A018075F16F}" dt="2024-01-21T01:00:25.600" v="64" actId="164"/>
           <ac:spMkLst>
             <pc:docMk/>
             <pc:sldMk cId="633367735" sldId="256"/>
@@ -515,7 +515,7 @@
           </ac:spMkLst>
         </pc:spChg>
         <pc:spChg chg="mod topLvl">
-          <ac:chgData name="Tony Strasser" userId="4957b490a1ac7b63" providerId="LiveId" clId="{78B8B651-5DB9-439E-BC8D-3A018075F16F}" dt="2024-01-09T07:32:06.198" v="45" actId="164"/>
+          <ac:chgData name="Tony Strasser" userId="4957b490a1ac7b63" providerId="LiveId" clId="{78B8B651-5DB9-439E-BC8D-3A018075F16F}" dt="2024-01-21T01:00:25.600" v="64" actId="164"/>
           <ac:spMkLst>
             <pc:docMk/>
             <pc:sldMk cId="633367735" sldId="256"/>
@@ -523,7 +523,7 @@
           </ac:spMkLst>
         </pc:spChg>
         <pc:spChg chg="mod topLvl">
-          <ac:chgData name="Tony Strasser" userId="4957b490a1ac7b63" providerId="LiveId" clId="{78B8B651-5DB9-439E-BC8D-3A018075F16F}" dt="2024-01-09T07:32:06.198" v="45" actId="164"/>
+          <ac:chgData name="Tony Strasser" userId="4957b490a1ac7b63" providerId="LiveId" clId="{78B8B651-5DB9-439E-BC8D-3A018075F16F}" dt="2024-01-21T01:00:25.600" v="64" actId="164"/>
           <ac:spMkLst>
             <pc:docMk/>
             <pc:sldMk cId="633367735" sldId="256"/>
@@ -531,7 +531,7 @@
           </ac:spMkLst>
         </pc:spChg>
         <pc:spChg chg="mod topLvl">
-          <ac:chgData name="Tony Strasser" userId="4957b490a1ac7b63" providerId="LiveId" clId="{78B8B651-5DB9-439E-BC8D-3A018075F16F}" dt="2024-01-09T07:32:06.198" v="45" actId="164"/>
+          <ac:chgData name="Tony Strasser" userId="4957b490a1ac7b63" providerId="LiveId" clId="{78B8B651-5DB9-439E-BC8D-3A018075F16F}" dt="2024-01-21T01:00:25.600" v="64" actId="164"/>
           <ac:spMkLst>
             <pc:docMk/>
             <pc:sldMk cId="633367735" sldId="256"/>
@@ -539,7 +539,7 @@
           </ac:spMkLst>
         </pc:spChg>
         <pc:spChg chg="mod topLvl">
-          <ac:chgData name="Tony Strasser" userId="4957b490a1ac7b63" providerId="LiveId" clId="{78B8B651-5DB9-439E-BC8D-3A018075F16F}" dt="2024-01-09T07:32:06.198" v="45" actId="164"/>
+          <ac:chgData name="Tony Strasser" userId="4957b490a1ac7b63" providerId="LiveId" clId="{78B8B651-5DB9-439E-BC8D-3A018075F16F}" dt="2024-01-21T01:00:25.600" v="64" actId="164"/>
           <ac:spMkLst>
             <pc:docMk/>
             <pc:sldMk cId="633367735" sldId="256"/>
@@ -547,7 +547,7 @@
           </ac:spMkLst>
         </pc:spChg>
         <pc:spChg chg="mod topLvl">
-          <ac:chgData name="Tony Strasser" userId="4957b490a1ac7b63" providerId="LiveId" clId="{78B8B651-5DB9-439E-BC8D-3A018075F16F}" dt="2024-01-09T07:32:06.198" v="45" actId="164"/>
+          <ac:chgData name="Tony Strasser" userId="4957b490a1ac7b63" providerId="LiveId" clId="{78B8B651-5DB9-439E-BC8D-3A018075F16F}" dt="2024-01-21T01:00:25.600" v="64" actId="164"/>
           <ac:spMkLst>
             <pc:docMk/>
             <pc:sldMk cId="633367735" sldId="256"/>
@@ -555,7 +555,7 @@
           </ac:spMkLst>
         </pc:spChg>
         <pc:spChg chg="mod topLvl">
-          <ac:chgData name="Tony Strasser" userId="4957b490a1ac7b63" providerId="LiveId" clId="{78B8B651-5DB9-439E-BC8D-3A018075F16F}" dt="2024-01-09T07:32:06.198" v="45" actId="164"/>
+          <ac:chgData name="Tony Strasser" userId="4957b490a1ac7b63" providerId="LiveId" clId="{78B8B651-5DB9-439E-BC8D-3A018075F16F}" dt="2024-01-21T01:00:25.600" v="64" actId="164"/>
           <ac:spMkLst>
             <pc:docMk/>
             <pc:sldMk cId="633367735" sldId="256"/>
@@ -563,19 +563,35 @@
           </ac:spMkLst>
         </pc:spChg>
         <pc:spChg chg="mod topLvl">
-          <ac:chgData name="Tony Strasser" userId="4957b490a1ac7b63" providerId="LiveId" clId="{78B8B651-5DB9-439E-BC8D-3A018075F16F}" dt="2024-01-09T07:32:06.198" v="45" actId="164"/>
+          <ac:chgData name="Tony Strasser" userId="4957b490a1ac7b63" providerId="LiveId" clId="{78B8B651-5DB9-439E-BC8D-3A018075F16F}" dt="2024-01-21T01:00:25.600" v="64" actId="164"/>
           <ac:spMkLst>
             <pc:docMk/>
             <pc:sldMk cId="633367735" sldId="256"/>
             <ac:spMk id="29" creationId="{AD6FEC21-4ADD-AD78-9E8A-6ED58CA7307A}"/>
           </ac:spMkLst>
         </pc:spChg>
+        <pc:grpChg chg="add del mod">
+          <ac:chgData name="Tony Strasser" userId="4957b490a1ac7b63" providerId="LiveId" clId="{78B8B651-5DB9-439E-BC8D-3A018075F16F}" dt="2024-01-21T00:54:23.999" v="46" actId="165"/>
+          <ac:grpSpMkLst>
+            <pc:docMk/>
+            <pc:sldMk cId="633367735" sldId="256"/>
+            <ac:grpSpMk id="2" creationId="{F2CE5E5B-0DCC-5D82-4F12-7FC098999A59}"/>
+          </ac:grpSpMkLst>
+        </pc:grpChg>
+        <pc:grpChg chg="add del mod">
+          <ac:chgData name="Tony Strasser" userId="4957b490a1ac7b63" providerId="LiveId" clId="{78B8B651-5DB9-439E-BC8D-3A018075F16F}" dt="2024-01-21T00:59:47.823" v="60" actId="165"/>
+          <ac:grpSpMkLst>
+            <pc:docMk/>
+            <pc:sldMk cId="633367735" sldId="256"/>
+            <ac:grpSpMk id="3" creationId="{2AF8A652-A33B-9135-E686-01A7B40C6549}"/>
+          </ac:grpSpMkLst>
+        </pc:grpChg>
         <pc:grpChg chg="add mod">
-          <ac:chgData name="Tony Strasser" userId="4957b490a1ac7b63" providerId="LiveId" clId="{78B8B651-5DB9-439E-BC8D-3A018075F16F}" dt="2024-01-09T07:32:06.198" v="45" actId="164"/>
+          <ac:chgData name="Tony Strasser" userId="4957b490a1ac7b63" providerId="LiveId" clId="{78B8B651-5DB9-439E-BC8D-3A018075F16F}" dt="2024-01-21T01:00:25.600" v="64" actId="164"/>
           <ac:grpSpMkLst>
             <pc:docMk/>
             <pc:sldMk cId="633367735" sldId="256"/>
-            <ac:grpSpMk id="2" creationId="{F2CE5E5B-0DCC-5D82-4F12-7FC098999A59}"/>
+            <ac:grpSpMk id="4" creationId="{B38F513A-93E1-7A7C-FAD9-96C55FFBFB4C}"/>
           </ac:grpSpMkLst>
         </pc:grpChg>
         <pc:grpChg chg="del">
@@ -587,7 +603,7 @@
           </ac:grpSpMkLst>
         </pc:grpChg>
         <pc:picChg chg="mod topLvl">
-          <ac:chgData name="Tony Strasser" userId="4957b490a1ac7b63" providerId="LiveId" clId="{78B8B651-5DB9-439E-BC8D-3A018075F16F}" dt="2024-01-09T07:32:06.198" v="45" actId="164"/>
+          <ac:chgData name="Tony Strasser" userId="4957b490a1ac7b63" providerId="LiveId" clId="{78B8B651-5DB9-439E-BC8D-3A018075F16F}" dt="2024-01-21T01:00:25.600" v="64" actId="164"/>
           <ac:picMkLst>
             <pc:docMk/>
             <pc:sldMk cId="633367735" sldId="256"/>
@@ -749,7 +765,7 @@
           <a:p>
             <a:fld id="{1C85E7D2-0D4B-4CBD-9C3E-4AB330E2219F}" type="datetimeFigureOut">
               <a:rPr lang="en-AU" smtClean="0"/>
-              <a:t>9/01/2024</a:t>
+              <a:t>21/01/2024</a:t>
             </a:fld>
             <a:endParaRPr lang="en-AU"/>
           </a:p>
@@ -949,7 +965,7 @@
           <a:p>
             <a:fld id="{1C85E7D2-0D4B-4CBD-9C3E-4AB330E2219F}" type="datetimeFigureOut">
               <a:rPr lang="en-AU" smtClean="0"/>
-              <a:t>9/01/2024</a:t>
+              <a:t>21/01/2024</a:t>
             </a:fld>
             <a:endParaRPr lang="en-AU"/>
           </a:p>
@@ -1159,7 +1175,7 @@
           <a:p>
             <a:fld id="{1C85E7D2-0D4B-4CBD-9C3E-4AB330E2219F}" type="datetimeFigureOut">
               <a:rPr lang="en-AU" smtClean="0"/>
-              <a:t>9/01/2024</a:t>
+              <a:t>21/01/2024</a:t>
             </a:fld>
             <a:endParaRPr lang="en-AU"/>
           </a:p>
@@ -1359,7 +1375,7 @@
           <a:p>
             <a:fld id="{1C85E7D2-0D4B-4CBD-9C3E-4AB330E2219F}" type="datetimeFigureOut">
               <a:rPr lang="en-AU" smtClean="0"/>
-              <a:t>9/01/2024</a:t>
+              <a:t>21/01/2024</a:t>
             </a:fld>
             <a:endParaRPr lang="en-AU"/>
           </a:p>
@@ -1635,7 +1651,7 @@
           <a:p>
             <a:fld id="{1C85E7D2-0D4B-4CBD-9C3E-4AB330E2219F}" type="datetimeFigureOut">
               <a:rPr lang="en-AU" smtClean="0"/>
-              <a:t>9/01/2024</a:t>
+              <a:t>21/01/2024</a:t>
             </a:fld>
             <a:endParaRPr lang="en-AU"/>
           </a:p>
@@ -1903,7 +1919,7 @@
           <a:p>
             <a:fld id="{1C85E7D2-0D4B-4CBD-9C3E-4AB330E2219F}" type="datetimeFigureOut">
               <a:rPr lang="en-AU" smtClean="0"/>
-              <a:t>9/01/2024</a:t>
+              <a:t>21/01/2024</a:t>
             </a:fld>
             <a:endParaRPr lang="en-AU"/>
           </a:p>
@@ -2318,7 +2334,7 @@
           <a:p>
             <a:fld id="{1C85E7D2-0D4B-4CBD-9C3E-4AB330E2219F}" type="datetimeFigureOut">
               <a:rPr lang="en-AU" smtClean="0"/>
-              <a:t>9/01/2024</a:t>
+              <a:t>21/01/2024</a:t>
             </a:fld>
             <a:endParaRPr lang="en-AU"/>
           </a:p>
@@ -2460,7 +2476,7 @@
           <a:p>
             <a:fld id="{1C85E7D2-0D4B-4CBD-9C3E-4AB330E2219F}" type="datetimeFigureOut">
               <a:rPr lang="en-AU" smtClean="0"/>
-              <a:t>9/01/2024</a:t>
+              <a:t>21/01/2024</a:t>
             </a:fld>
             <a:endParaRPr lang="en-AU"/>
           </a:p>
@@ -2573,7 +2589,7 @@
           <a:p>
             <a:fld id="{1C85E7D2-0D4B-4CBD-9C3E-4AB330E2219F}" type="datetimeFigureOut">
               <a:rPr lang="en-AU" smtClean="0"/>
-              <a:t>9/01/2024</a:t>
+              <a:t>21/01/2024</a:t>
             </a:fld>
             <a:endParaRPr lang="en-AU"/>
           </a:p>
@@ -2886,7 +2902,7 @@
           <a:p>
             <a:fld id="{1C85E7D2-0D4B-4CBD-9C3E-4AB330E2219F}" type="datetimeFigureOut">
               <a:rPr lang="en-AU" smtClean="0"/>
-              <a:t>9/01/2024</a:t>
+              <a:t>21/01/2024</a:t>
             </a:fld>
             <a:endParaRPr lang="en-AU"/>
           </a:p>
@@ -3175,7 +3191,7 @@
           <a:p>
             <a:fld id="{1C85E7D2-0D4B-4CBD-9C3E-4AB330E2219F}" type="datetimeFigureOut">
               <a:rPr lang="en-AU" smtClean="0"/>
-              <a:t>9/01/2024</a:t>
+              <a:t>21/01/2024</a:t>
             </a:fld>
             <a:endParaRPr lang="en-AU"/>
           </a:p>
@@ -3418,7 +3434,7 @@
           <a:p>
             <a:fld id="{1C85E7D2-0D4B-4CBD-9C3E-4AB330E2219F}" type="datetimeFigureOut">
               <a:rPr lang="en-AU" smtClean="0"/>
-              <a:t>9/01/2024</a:t>
+              <a:t>21/01/2024</a:t>
             </a:fld>
             <a:endParaRPr lang="en-AU"/>
           </a:p>
@@ -3837,10 +3853,10 @@
       </p:grpSpPr>
       <p:grpSp>
         <p:nvGrpSpPr>
-          <p:cNvPr id="2" name="Group 1">
-            <a:extLst>
-              <a:ext uri="{FF2B5EF4-FFF2-40B4-BE49-F238E27FC236}">
-                <a16:creationId xmlns:a16="http://schemas.microsoft.com/office/drawing/2014/main" id="{F2CE5E5B-0DCC-5D82-4F12-7FC098999A59}"/>
+          <p:cNvPr id="4" name="Group 3">
+            <a:extLst>
+              <a:ext uri="{FF2B5EF4-FFF2-40B4-BE49-F238E27FC236}">
+                <a16:creationId xmlns:a16="http://schemas.microsoft.com/office/drawing/2014/main" id="{B38F513A-93E1-7A7C-FAD9-96C55FFBFB4C}"/>
               </a:ext>
             </a:extLst>
           </p:cNvPr>
@@ -3850,9 +3866,9 @@
         <p:grpSpPr>
           <a:xfrm>
             <a:off x="880915" y="102610"/>
-            <a:ext cx="10784881" cy="5073186"/>
+            <a:ext cx="10784881" cy="5435304"/>
             <a:chOff x="880915" y="102610"/>
-            <a:chExt cx="10784881" cy="5073186"/>
+            <a:chExt cx="10784881" cy="5435304"/>
           </a:xfrm>
         </p:grpSpPr>
         <p:pic>
@@ -3882,8 +3898,8 @@
           </p:blipFill>
           <p:spPr>
             <a:xfrm>
-              <a:off x="2345496" y="206574"/>
-              <a:ext cx="7496715" cy="4969222"/>
+              <a:off x="2261849" y="206573"/>
+              <a:ext cx="7603045" cy="5331341"/>
             </a:xfrm>
             <a:prstGeom prst="rect">
               <a:avLst/>
@@ -4196,7 +4212,7 @@
           </p:nvSpPr>
           <p:spPr>
             <a:xfrm>
-              <a:off x="7357561" y="3760566"/>
+              <a:off x="7357561" y="4011149"/>
               <a:ext cx="1416606" cy="369332"/>
             </a:xfrm>
             <a:prstGeom prst="rect">
@@ -4231,7 +4247,7 @@
           </p:nvSpPr>
           <p:spPr>
             <a:xfrm>
-              <a:off x="8774806" y="3848641"/>
+              <a:off x="8774806" y="4099224"/>
               <a:ext cx="360609" cy="193183"/>
             </a:xfrm>
             <a:prstGeom prst="rightArrow">
@@ -4277,7 +4293,7 @@
           </p:nvSpPr>
           <p:spPr>
             <a:xfrm>
-              <a:off x="7403182" y="4129898"/>
+              <a:off x="7403182" y="4380481"/>
               <a:ext cx="1325363" cy="369332"/>
             </a:xfrm>
             <a:prstGeom prst="rect">
@@ -4312,7 +4328,7 @@
           </p:nvSpPr>
           <p:spPr>
             <a:xfrm>
-              <a:off x="8774806" y="4217973"/>
+              <a:off x="8774806" y="4468556"/>
               <a:ext cx="360609" cy="193183"/>
             </a:xfrm>
             <a:prstGeom prst="rightArrow">
@@ -4358,7 +4374,7 @@
           </p:nvSpPr>
           <p:spPr>
             <a:xfrm>
-              <a:off x="8082246" y="4587305"/>
+              <a:off x="8082246" y="4837888"/>
               <a:ext cx="691921" cy="369332"/>
             </a:xfrm>
             <a:prstGeom prst="rect">
@@ -4393,7 +4409,7 @@
           </p:nvSpPr>
           <p:spPr>
             <a:xfrm>
-              <a:off x="8774806" y="4675380"/>
+              <a:off x="8774806" y="4925963"/>
               <a:ext cx="360609" cy="193183"/>
             </a:xfrm>
             <a:prstGeom prst="rightArrow">
@@ -4566,7 +4582,7 @@
           </p:nvSpPr>
           <p:spPr>
             <a:xfrm>
-              <a:off x="5586283" y="500197"/>
+              <a:off x="5797929" y="500197"/>
               <a:ext cx="1271502" cy="369332"/>
             </a:xfrm>
             <a:prstGeom prst="rect">
@@ -4601,7 +4617,7 @@
           </p:nvSpPr>
           <p:spPr>
             <a:xfrm>
-              <a:off x="6785306" y="604161"/>
+              <a:off x="6996952" y="604161"/>
               <a:ext cx="360609" cy="193183"/>
             </a:xfrm>
             <a:prstGeom prst="rightArrow">

</xml_diff>